<commit_message>
World Tuberculosis Data Analysis
</commit_message>
<xml_diff>
--- a/TB_data_inTableau.pptx
+++ b/TB_data_inTableau.pptx
@@ -297,7 +297,7 @@
           <a:p>
             <a:fld id="{EED1C14C-A143-42F5-B247-D0E800131009}" type="datetimeFigureOut">
               <a:rPr lang="en-US" smtClean="0"/>
-              <a:t>6/24/20</a:t>
+              <a:t>6/26/20</a:t>
             </a:fld>
             <a:endParaRPr lang="en-US"/>
           </a:p>
@@ -467,7 +467,7 @@
           <a:p>
             <a:fld id="{EED1C14C-A143-42F5-B247-D0E800131009}" type="datetimeFigureOut">
               <a:rPr lang="en-US" smtClean="0"/>
-              <a:t>6/24/20</a:t>
+              <a:t>6/26/20</a:t>
             </a:fld>
             <a:endParaRPr lang="en-US"/>
           </a:p>
@@ -647,7 +647,7 @@
           <a:p>
             <a:fld id="{EED1C14C-A143-42F5-B247-D0E800131009}" type="datetimeFigureOut">
               <a:rPr lang="en-US" smtClean="0"/>
-              <a:t>6/24/20</a:t>
+              <a:t>6/26/20</a:t>
             </a:fld>
             <a:endParaRPr lang="en-US"/>
           </a:p>
@@ -817,7 +817,7 @@
           <a:p>
             <a:fld id="{EED1C14C-A143-42F5-B247-D0E800131009}" type="datetimeFigureOut">
               <a:rPr lang="en-US" smtClean="0"/>
-              <a:t>6/24/20</a:t>
+              <a:t>6/26/20</a:t>
             </a:fld>
             <a:endParaRPr lang="en-US"/>
           </a:p>
@@ -1085,7 +1085,7 @@
           <a:p>
             <a:fld id="{EED1C14C-A143-42F5-B247-D0E800131009}" type="datetimeFigureOut">
               <a:rPr lang="en-US" smtClean="0"/>
-              <a:t>6/24/20</a:t>
+              <a:t>6/26/20</a:t>
             </a:fld>
             <a:endParaRPr lang="en-US"/>
           </a:p>
@@ -1317,7 +1317,7 @@
           <a:p>
             <a:fld id="{EED1C14C-A143-42F5-B247-D0E800131009}" type="datetimeFigureOut">
               <a:rPr lang="en-US" smtClean="0"/>
-              <a:t>6/24/20</a:t>
+              <a:t>6/26/20</a:t>
             </a:fld>
             <a:endParaRPr lang="en-US"/>
           </a:p>
@@ -1676,7 +1676,7 @@
           <a:p>
             <a:fld id="{EED1C14C-A143-42F5-B247-D0E800131009}" type="datetimeFigureOut">
               <a:rPr lang="en-US" smtClean="0"/>
-              <a:t>6/24/20</a:t>
+              <a:t>6/26/20</a:t>
             </a:fld>
             <a:endParaRPr lang="en-US"/>
           </a:p>
@@ -1817,7 +1817,7 @@
           <a:p>
             <a:fld id="{EED1C14C-A143-42F5-B247-D0E800131009}" type="datetimeFigureOut">
               <a:rPr lang="en-US" smtClean="0"/>
-              <a:t>6/24/20</a:t>
+              <a:t>6/26/20</a:t>
             </a:fld>
             <a:endParaRPr lang="en-US"/>
           </a:p>
@@ -1912,7 +1912,7 @@
           <a:p>
             <a:fld id="{EED1C14C-A143-42F5-B247-D0E800131009}" type="datetimeFigureOut">
               <a:rPr lang="en-US" smtClean="0"/>
-              <a:t>6/24/20</a:t>
+              <a:t>6/26/20</a:t>
             </a:fld>
             <a:endParaRPr lang="en-US"/>
           </a:p>
@@ -2269,7 +2269,7 @@
           <a:p>
             <a:fld id="{EED1C14C-A143-42F5-B247-D0E800131009}" type="datetimeFigureOut">
               <a:rPr lang="en-US" smtClean="0"/>
-              <a:t>6/24/20</a:t>
+              <a:t>6/26/20</a:t>
             </a:fld>
             <a:endParaRPr lang="en-US"/>
           </a:p>
@@ -2626,7 +2626,7 @@
           <a:p>
             <a:fld id="{EED1C14C-A143-42F5-B247-D0E800131009}" type="datetimeFigureOut">
               <a:rPr lang="en-US" smtClean="0"/>
-              <a:t>6/24/20</a:t>
+              <a:t>6/26/20</a:t>
             </a:fld>
             <a:endParaRPr lang="en-US"/>
           </a:p>
@@ -2868,7 +2868,7 @@
           <a:p>
             <a:fld id="{EED1C14C-A143-42F5-B247-D0E800131009}" type="datetimeFigureOut">
               <a:rPr lang="en-US" smtClean="0"/>
-              <a:t>6/24/20</a:t>
+              <a:t>6/26/20</a:t>
             </a:fld>
             <a:endParaRPr lang="en-US"/>
           </a:p>
@@ -3387,6 +3387,48 @@
           </a:p>
         </p:txBody>
       </p:sp>
+      <p:sp>
+        <p:nvSpPr>
+          <p:cNvPr id="4" name="Rectangle 3">
+            <a:extLst>
+              <a:ext uri="{FF2B5EF4-FFF2-40B4-BE49-F238E27FC236}">
+                <a16:creationId xmlns:a16="http://schemas.microsoft.com/office/drawing/2014/main" id="{25D54946-AFDE-3E47-8609-9346063D3A5E}"/>
+              </a:ext>
+            </a:extLst>
+          </p:cNvPr>
+          <p:cNvSpPr/>
+          <p:nvPr/>
+        </p:nvSpPr>
+        <p:spPr>
+          <a:xfrm>
+            <a:off x="3048000" y="5592438"/>
+            <a:ext cx="6096000" cy="646331"/>
+          </a:xfrm>
+          <a:prstGeom prst="rect">
+            <a:avLst/>
+          </a:prstGeom>
+        </p:spPr>
+        <p:txBody>
+          <a:bodyPr>
+            <a:spAutoFit/>
+          </a:bodyPr>
+          <a:lstStyle/>
+          <a:p>
+            <a:pPr algn="ctr"/>
+            <a:r>
+              <a:rPr lang="en-US" dirty="0"/>
+              <a:t>Data Science and Analytics Bootcamp with Stack Education</a:t>
+            </a:r>
+          </a:p>
+          <a:p>
+            <a:pPr algn="ctr"/>
+            <a:r>
+              <a:rPr lang="en-US" dirty="0"/>
+              <a:t>Framingham State University</a:t>
+            </a:r>
+          </a:p>
+        </p:txBody>
+      </p:sp>
     </p:spTree>
     <p:extLst>
       <p:ext uri="{BB962C8B-B14F-4D97-AF65-F5344CB8AC3E}">

</xml_diff>